<commit_message>
feat : Update an ipynb file
Change the note file to add a reference site.
</commit_message>
<xml_diff>
--- a/72_Edit_Distance_My_Note.pptx
+++ b/72_Edit_Distance_My_Note.pptx
@@ -104,6 +104,11 @@
       </a:defRPr>
     </a:lvl9pPr>
   </p:defaultTextStyle>
+  <p:extLst>
+    <p:ext uri="{EFAFB233-063F-42B5-8137-9DF3F51BA10A}">
+      <p15:sldGuideLst xmlns:p15="http://schemas.microsoft.com/office/powerpoint/2012/main"/>
+    </p:ext>
+  </p:extLst>
 </p:presentation>
 </file>
 
@@ -254,7 +259,7 @@
           <a:p>
             <a:fld id="{8F05EAA4-0E32-413D-A390-EE3EFF8B0E7E}" type="datetimeFigureOut">
               <a:rPr lang="ko-KR" altLang="en-US" smtClean="0"/>
-              <a:t>2021-02-18</a:t>
+              <a:t>2021-02-20</a:t>
             </a:fld>
             <a:endParaRPr lang="ko-KR" altLang="en-US"/>
           </a:p>
@@ -452,7 +457,7 @@
           <a:p>
             <a:fld id="{8F05EAA4-0E32-413D-A390-EE3EFF8B0E7E}" type="datetimeFigureOut">
               <a:rPr lang="ko-KR" altLang="en-US" smtClean="0"/>
-              <a:t>2021-02-18</a:t>
+              <a:t>2021-02-20</a:t>
             </a:fld>
             <a:endParaRPr lang="ko-KR" altLang="en-US"/>
           </a:p>
@@ -660,7 +665,7 @@
           <a:p>
             <a:fld id="{8F05EAA4-0E32-413D-A390-EE3EFF8B0E7E}" type="datetimeFigureOut">
               <a:rPr lang="ko-KR" altLang="en-US" smtClean="0"/>
-              <a:t>2021-02-18</a:t>
+              <a:t>2021-02-20</a:t>
             </a:fld>
             <a:endParaRPr lang="ko-KR" altLang="en-US"/>
           </a:p>
@@ -858,7 +863,7 @@
           <a:p>
             <a:fld id="{8F05EAA4-0E32-413D-A390-EE3EFF8B0E7E}" type="datetimeFigureOut">
               <a:rPr lang="ko-KR" altLang="en-US" smtClean="0"/>
-              <a:t>2021-02-18</a:t>
+              <a:t>2021-02-20</a:t>
             </a:fld>
             <a:endParaRPr lang="ko-KR" altLang="en-US"/>
           </a:p>
@@ -1133,7 +1138,7 @@
           <a:p>
             <a:fld id="{8F05EAA4-0E32-413D-A390-EE3EFF8B0E7E}" type="datetimeFigureOut">
               <a:rPr lang="ko-KR" altLang="en-US" smtClean="0"/>
-              <a:t>2021-02-18</a:t>
+              <a:t>2021-02-20</a:t>
             </a:fld>
             <a:endParaRPr lang="ko-KR" altLang="en-US"/>
           </a:p>
@@ -1398,7 +1403,7 @@
           <a:p>
             <a:fld id="{8F05EAA4-0E32-413D-A390-EE3EFF8B0E7E}" type="datetimeFigureOut">
               <a:rPr lang="ko-KR" altLang="en-US" smtClean="0"/>
-              <a:t>2021-02-18</a:t>
+              <a:t>2021-02-20</a:t>
             </a:fld>
             <a:endParaRPr lang="ko-KR" altLang="en-US"/>
           </a:p>
@@ -1810,7 +1815,7 @@
           <a:p>
             <a:fld id="{8F05EAA4-0E32-413D-A390-EE3EFF8B0E7E}" type="datetimeFigureOut">
               <a:rPr lang="ko-KR" altLang="en-US" smtClean="0"/>
-              <a:t>2021-02-18</a:t>
+              <a:t>2021-02-20</a:t>
             </a:fld>
             <a:endParaRPr lang="ko-KR" altLang="en-US"/>
           </a:p>
@@ -1951,7 +1956,7 @@
           <a:p>
             <a:fld id="{8F05EAA4-0E32-413D-A390-EE3EFF8B0E7E}" type="datetimeFigureOut">
               <a:rPr lang="ko-KR" altLang="en-US" smtClean="0"/>
-              <a:t>2021-02-18</a:t>
+              <a:t>2021-02-20</a:t>
             </a:fld>
             <a:endParaRPr lang="ko-KR" altLang="en-US"/>
           </a:p>
@@ -2064,7 +2069,7 @@
           <a:p>
             <a:fld id="{8F05EAA4-0E32-413D-A390-EE3EFF8B0E7E}" type="datetimeFigureOut">
               <a:rPr lang="ko-KR" altLang="en-US" smtClean="0"/>
-              <a:t>2021-02-18</a:t>
+              <a:t>2021-02-20</a:t>
             </a:fld>
             <a:endParaRPr lang="ko-KR" altLang="en-US"/>
           </a:p>
@@ -2375,7 +2380,7 @@
           <a:p>
             <a:fld id="{8F05EAA4-0E32-413D-A390-EE3EFF8B0E7E}" type="datetimeFigureOut">
               <a:rPr lang="ko-KR" altLang="en-US" smtClean="0"/>
-              <a:t>2021-02-18</a:t>
+              <a:t>2021-02-20</a:t>
             </a:fld>
             <a:endParaRPr lang="ko-KR" altLang="en-US"/>
           </a:p>
@@ -2663,7 +2668,7 @@
           <a:p>
             <a:fld id="{8F05EAA4-0E32-413D-A390-EE3EFF8B0E7E}" type="datetimeFigureOut">
               <a:rPr lang="ko-KR" altLang="en-US" smtClean="0"/>
-              <a:t>2021-02-18</a:t>
+              <a:t>2021-02-20</a:t>
             </a:fld>
             <a:endParaRPr lang="ko-KR" altLang="en-US"/>
           </a:p>
@@ -2904,7 +2909,7 @@
           <a:p>
             <a:fld id="{8F05EAA4-0E32-413D-A390-EE3EFF8B0E7E}" type="datetimeFigureOut">
               <a:rPr lang="ko-KR" altLang="en-US" smtClean="0"/>
-              <a:t>2021-02-18</a:t>
+              <a:t>2021-02-20</a:t>
             </a:fld>
             <a:endParaRPr lang="ko-KR" altLang="en-US"/>
           </a:p>
@@ -3465,8 +3470,8 @@
         </p:nvSpPr>
         <p:spPr>
           <a:xfrm>
-            <a:off x="9241645" y="180975"/>
-            <a:ext cx="2674130" cy="707886"/>
+            <a:off x="8678308" y="158397"/>
+            <a:ext cx="3403496" cy="707886"/>
           </a:xfrm>
           <a:prstGeom prst="rect">
             <a:avLst/>
@@ -3504,7 +3509,10 @@
             </a:r>
           </a:p>
           <a:p>
-            <a:endParaRPr lang="ko-KR" altLang="en-US" sz="1000" dirty="0"/>
+            <a:r>
+              <a:rPr lang="en-US" altLang="ko-KR" sz="1000" dirty="0"/>
+              <a:t>  https://baihuqian.github.io/2018-08-15-edit-distance/</a:t>
+            </a:r>
           </a:p>
         </p:txBody>
       </p:sp>
@@ -3635,7 +3643,7 @@
         </p:blipFill>
         <p:spPr>
           <a:xfrm>
-            <a:off x="7064191" y="342900"/>
+            <a:off x="6296546" y="342900"/>
             <a:ext cx="1831578" cy="6391275"/>
           </a:xfrm>
           <a:prstGeom prst="rect">
@@ -3665,7 +3673,7 @@
         </p:blipFill>
         <p:spPr>
           <a:xfrm>
-            <a:off x="9503172" y="2778429"/>
+            <a:off x="8735527" y="2778429"/>
             <a:ext cx="2322903" cy="1998120"/>
           </a:xfrm>
           <a:prstGeom prst="rect">
@@ -3687,7 +3695,7 @@
         </p:nvSpPr>
         <p:spPr>
           <a:xfrm>
-            <a:off x="9103023" y="3496501"/>
+            <a:off x="8335378" y="3496501"/>
             <a:ext cx="192895" cy="266700"/>
           </a:xfrm>
           <a:prstGeom prst="rightArrow">

</xml_diff>